<commit_message>
Hello👋 WeAreDevelopers 2025 Berlin
</commit_message>
<xml_diff>
--- a/multi-tenancy-wearedevelopers-2025_30mins.pptx
+++ b/multi-tenancy-wearedevelopers-2025_30mins.pptx
@@ -21751,7 +21751,7 @@
           <a:graphicData uri="http://schemas.openxmlformats.org/presentationml/2006/ole">
             <mc:AlternateContent xmlns:mc="http://schemas.openxmlformats.org/markup-compatibility/2006">
               <mc:Choice xmlns:v="urn:schemas-microsoft-com:vml" Requires="v">
-                <p:oleObj spid="_x0000_s1036" name="Bitmap Image" r:id="rId5" imgW="6610320" imgH="1574640" progId="Paint.Picture">
+                <p:oleObj spid="_x0000_s1040" name="Bitmap Image" r:id="rId5" imgW="6610320" imgH="1574640" progId="Paint.Picture">
                   <p:embed/>
                 </p:oleObj>
               </mc:Choice>
@@ -32614,7 +32614,7 @@
         </p:nvSpPr>
         <p:spPr>
           <a:xfrm>
-            <a:off x="493345" y="5767432"/>
+            <a:off x="590583" y="5602511"/>
             <a:ext cx="10986646" cy="769441"/>
           </a:xfrm>
           <a:prstGeom prst="rect">
@@ -32640,36 +32640,6 @@
           </a:p>
         </p:txBody>
       </p:sp>
-      <p:pic>
-        <p:nvPicPr>
-          <p:cNvPr id="40" name="Picture 39">
-            <a:extLst>
-              <a:ext uri="{FF2B5EF4-FFF2-40B4-BE49-F238E27FC236}">
-                <a16:creationId xmlns:a16="http://schemas.microsoft.com/office/drawing/2014/main" id="{EC58CA4B-267C-6A9A-85C2-A453C5E58F54}"/>
-              </a:ext>
-            </a:extLst>
-          </p:cNvPr>
-          <p:cNvPicPr>
-            <a:picLocks noChangeAspect="1"/>
-          </p:cNvPicPr>
-          <p:nvPr/>
-        </p:nvPicPr>
-        <p:blipFill>
-          <a:blip r:embed="rId9"/>
-          <a:stretch>
-            <a:fillRect/>
-          </a:stretch>
-        </p:blipFill>
-        <p:spPr>
-          <a:xfrm>
-            <a:off x="7730053" y="1594791"/>
-            <a:ext cx="3749938" cy="3668418"/>
-          </a:xfrm>
-          <a:prstGeom prst="rect">
-            <a:avLst/>
-          </a:prstGeom>
-        </p:spPr>
-      </p:pic>
       <p:sp>
         <p:nvSpPr>
           <p:cNvPr id="3" name="Rectangle: Rounded Corners 2">
@@ -32755,8 +32725,8 @@
         </p:nvSpPr>
         <p:spPr>
           <a:xfrm>
-            <a:off x="7730053" y="1156526"/>
-            <a:ext cx="3660190" cy="461665"/>
+            <a:off x="8115919" y="1195405"/>
+            <a:ext cx="3364071" cy="430887"/>
           </a:xfrm>
           <a:prstGeom prst="rect">
             <a:avLst/>
@@ -32771,16 +32741,82 @@
           <a:p>
             <a:pPr algn="ctr"/>
             <a:r>
-              <a:rPr lang="en-US" sz="2400" dirty="0">
+              <a:rPr lang="en-US" sz="2200" dirty="0">
                 <a:latin typeface="Euclid Circular B" panose="020B0504000000000000" pitchFamily="34" charset="0"/>
                 <a:ea typeface="Euclid Circular B" panose="020B0504000000000000" pitchFamily="34" charset="0"/>
               </a:rPr>
               <a:t>Download Presentation</a:t>
             </a:r>
-            <a:endParaRPr lang="tr-TR" sz="2400" dirty="0"/>
+            <a:endParaRPr lang="tr-TR" sz="2200" dirty="0"/>
           </a:p>
         </p:txBody>
       </p:sp>
+      <p:pic>
+        <p:nvPicPr>
+          <p:cNvPr id="4" name="Picture 3">
+            <a:extLst>
+              <a:ext uri="{FF2B5EF4-FFF2-40B4-BE49-F238E27FC236}">
+                <a16:creationId xmlns:a16="http://schemas.microsoft.com/office/drawing/2014/main" id="{9DC5D1B6-0066-4DD5-9C71-EE73AE1BBAB1}"/>
+              </a:ext>
+            </a:extLst>
+          </p:cNvPr>
+          <p:cNvPicPr>
+            <a:picLocks noChangeAspect="1"/>
+          </p:cNvPicPr>
+          <p:nvPr/>
+        </p:nvPicPr>
+        <p:blipFill>
+          <a:blip r:embed="rId9"/>
+          <a:stretch>
+            <a:fillRect/>
+          </a:stretch>
+        </p:blipFill>
+        <p:spPr>
+          <a:xfrm>
+            <a:off x="7728790" y="1657070"/>
+            <a:ext cx="3751200" cy="3819404"/>
+          </a:xfrm>
+          <a:prstGeom prst="rect">
+            <a:avLst/>
+          </a:prstGeom>
+        </p:spPr>
+      </p:pic>
+      <p:pic>
+        <p:nvPicPr>
+          <p:cNvPr id="7" name="Picture 6">
+            <a:extLst>
+              <a:ext uri="{FF2B5EF4-FFF2-40B4-BE49-F238E27FC236}">
+                <a16:creationId xmlns:a16="http://schemas.microsoft.com/office/drawing/2014/main" id="{F4CC457E-2A87-4910-BC6D-C81CD2B5DBE5}"/>
+              </a:ext>
+            </a:extLst>
+          </p:cNvPr>
+          <p:cNvPicPr>
+            <a:picLocks noChangeAspect="1"/>
+          </p:cNvPicPr>
+          <p:nvPr/>
+        </p:nvPicPr>
+        <p:blipFill>
+          <a:blip r:embed="rId10">
+            <a:extLst>
+              <a:ext uri="{28A0092B-C50C-407E-A947-70E740481C1C}">
+                <a14:useLocalDpi xmlns:a14="http://schemas.microsoft.com/office/drawing/2010/main" val="0"/>
+              </a:ext>
+            </a:extLst>
+          </a:blip>
+          <a:stretch>
+            <a:fillRect/>
+          </a:stretch>
+        </p:blipFill>
+        <p:spPr>
+          <a:xfrm>
+            <a:off x="7790382" y="1241868"/>
+            <a:ext cx="325537" cy="325537"/>
+          </a:xfrm>
+          <a:prstGeom prst="rect">
+            <a:avLst/>
+          </a:prstGeom>
+        </p:spPr>
+      </p:pic>
     </p:spTree>
     <p:extLst>
       <p:ext uri="{BB962C8B-B14F-4D97-AF65-F5344CB8AC3E}">

</xml_diff>

<commit_message>
Hi 👋 WeAreDevelopers 2025
</commit_message>
<xml_diff>
--- a/multi-tenancy-wearedevelopers-2025_30mins.pptx
+++ b/multi-tenancy-wearedevelopers-2025_30mins.pptx
@@ -3453,7 +3453,7 @@
           <a:p>
             <a:fld id="{0243448F-3A69-4D00-BEC4-199950B08586}" type="datetimeFigureOut">
               <a:rPr lang="en-US" smtClean="0"/>
-              <a:t>7/5/2025</a:t>
+              <a:t>7/10/2025</a:t>
             </a:fld>
             <a:endParaRPr lang="en-US"/>
           </a:p>
@@ -11252,7 +11252,7 @@
           <a:p>
             <a:fld id="{2A14C9FE-EBC3-45D3-899C-58AAF4F8AF71}" type="datetimeFigureOut">
               <a:rPr lang="en-US" smtClean="0"/>
-              <a:t>7/5/2025</a:t>
+              <a:t>7/10/2025</a:t>
             </a:fld>
             <a:endParaRPr lang="en-US"/>
           </a:p>
@@ -11450,7 +11450,7 @@
           <a:p>
             <a:fld id="{2A14C9FE-EBC3-45D3-899C-58AAF4F8AF71}" type="datetimeFigureOut">
               <a:rPr lang="en-US" smtClean="0"/>
-              <a:t>7/5/2025</a:t>
+              <a:t>7/10/2025</a:t>
             </a:fld>
             <a:endParaRPr lang="en-US"/>
           </a:p>
@@ -11658,7 +11658,7 @@
           <a:p>
             <a:fld id="{2A14C9FE-EBC3-45D3-899C-58AAF4F8AF71}" type="datetimeFigureOut">
               <a:rPr lang="en-US" smtClean="0"/>
-              <a:t>7/5/2025</a:t>
+              <a:t>7/10/2025</a:t>
             </a:fld>
             <a:endParaRPr lang="en-US"/>
           </a:p>
@@ -11856,7 +11856,7 @@
           <a:p>
             <a:fld id="{2A14C9FE-EBC3-45D3-899C-58AAF4F8AF71}" type="datetimeFigureOut">
               <a:rPr lang="en-US" smtClean="0"/>
-              <a:t>7/5/2025</a:t>
+              <a:t>7/10/2025</a:t>
             </a:fld>
             <a:endParaRPr lang="en-US"/>
           </a:p>
@@ -12131,7 +12131,7 @@
           <a:p>
             <a:fld id="{2A14C9FE-EBC3-45D3-899C-58AAF4F8AF71}" type="datetimeFigureOut">
               <a:rPr lang="en-US" smtClean="0"/>
-              <a:t>7/5/2025</a:t>
+              <a:t>7/10/2025</a:t>
             </a:fld>
             <a:endParaRPr lang="en-US"/>
           </a:p>
@@ -12396,7 +12396,7 @@
           <a:p>
             <a:fld id="{2A14C9FE-EBC3-45D3-899C-58AAF4F8AF71}" type="datetimeFigureOut">
               <a:rPr lang="en-US" smtClean="0"/>
-              <a:t>7/5/2025</a:t>
+              <a:t>7/10/2025</a:t>
             </a:fld>
             <a:endParaRPr lang="en-US"/>
           </a:p>
@@ -12808,7 +12808,7 @@
           <a:p>
             <a:fld id="{2A14C9FE-EBC3-45D3-899C-58AAF4F8AF71}" type="datetimeFigureOut">
               <a:rPr lang="en-US" smtClean="0"/>
-              <a:t>7/5/2025</a:t>
+              <a:t>7/10/2025</a:t>
             </a:fld>
             <a:endParaRPr lang="en-US"/>
           </a:p>
@@ -12949,7 +12949,7 @@
           <a:p>
             <a:fld id="{2A14C9FE-EBC3-45D3-899C-58AAF4F8AF71}" type="datetimeFigureOut">
               <a:rPr lang="en-US" smtClean="0"/>
-              <a:t>7/5/2025</a:t>
+              <a:t>7/10/2025</a:t>
             </a:fld>
             <a:endParaRPr lang="en-US"/>
           </a:p>
@@ -13062,7 +13062,7 @@
           <a:p>
             <a:fld id="{2A14C9FE-EBC3-45D3-899C-58AAF4F8AF71}" type="datetimeFigureOut">
               <a:rPr lang="en-US" smtClean="0"/>
-              <a:t>7/5/2025</a:t>
+              <a:t>7/10/2025</a:t>
             </a:fld>
             <a:endParaRPr lang="en-US"/>
           </a:p>
@@ -13373,7 +13373,7 @@
           <a:p>
             <a:fld id="{2A14C9FE-EBC3-45D3-899C-58AAF4F8AF71}" type="datetimeFigureOut">
               <a:rPr lang="en-US" smtClean="0"/>
-              <a:t>7/5/2025</a:t>
+              <a:t>7/10/2025</a:t>
             </a:fld>
             <a:endParaRPr lang="en-US"/>
           </a:p>
@@ -13661,7 +13661,7 @@
           <a:p>
             <a:fld id="{2A14C9FE-EBC3-45D3-899C-58AAF4F8AF71}" type="datetimeFigureOut">
               <a:rPr lang="en-US" smtClean="0"/>
-              <a:t>7/5/2025</a:t>
+              <a:t>7/10/2025</a:t>
             </a:fld>
             <a:endParaRPr lang="en-US"/>
           </a:p>
@@ -13911,7 +13911,7 @@
           <a:p>
             <a:fld id="{2A14C9FE-EBC3-45D3-899C-58AAF4F8AF71}" type="datetimeFigureOut">
               <a:rPr lang="en-US" smtClean="0"/>
-              <a:t>7/5/2025</a:t>
+              <a:t>7/10/2025</a:t>
             </a:fld>
             <a:endParaRPr lang="en-US"/>
           </a:p>
@@ -18121,7 +18121,7 @@
                     <a:ea typeface="Roboto" pitchFamily="34" charset="-122"/>
                     <a:cs typeface="Roboto" pitchFamily="34" charset="-120"/>
                   </a:rPr>
-                  <a:t>Software Engineering</a:t>
+                  <a:t>Graduated from Software Engineering</a:t>
                 </a:r>
                 <a:endParaRPr lang="en-US" dirty="0"/>
               </a:p>
@@ -18272,7 +18272,7 @@
                     <a:ea typeface="Roboto" pitchFamily="34" charset="-122"/>
                     <a:cs typeface="Roboto" pitchFamily="34" charset="-120"/>
                   </a:rPr>
-                  <a:t>Master Degree</a:t>
+                  <a:t>Completed University Master Degree</a:t>
                 </a:r>
                 <a:endParaRPr lang="en-US" dirty="0"/>
               </a:p>
@@ -21751,7 +21751,7 @@
           <a:graphicData uri="http://schemas.openxmlformats.org/presentationml/2006/ole">
             <mc:AlternateContent xmlns:mc="http://schemas.openxmlformats.org/markup-compatibility/2006">
               <mc:Choice xmlns:v="urn:schemas-microsoft-com:vml" Requires="v">
-                <p:oleObj spid="_x0000_s1040" name="Bitmap Image" r:id="rId5" imgW="6610320" imgH="1574640" progId="Paint.Picture">
+                <p:oleObj spid="_x0000_s1042" name="Bitmap Image" r:id="rId5" imgW="6610320" imgH="1574640" progId="Paint.Picture">
                   <p:embed/>
                 </p:oleObj>
               </mc:Choice>
@@ -23431,7 +23431,7 @@
         </p:nvSpPr>
         <p:spPr>
           <a:xfrm>
-            <a:off x="3006723" y="357510"/>
+            <a:off x="2872042" y="357510"/>
             <a:ext cx="7920037" cy="916579"/>
           </a:xfrm>
         </p:spPr>
@@ -23482,8 +23482,8 @@
         </p:blipFill>
         <p:spPr>
           <a:xfrm>
-            <a:off x="9321475" y="471559"/>
-            <a:ext cx="2478769" cy="657023"/>
+            <a:off x="9821906" y="489810"/>
+            <a:ext cx="2039582" cy="540612"/>
           </a:xfrm>
           <a:prstGeom prst="rect">
             <a:avLst/>
@@ -23540,7 +23540,7 @@
         </p:nvCxnSpPr>
         <p:spPr>
           <a:xfrm>
-            <a:off x="2955923" y="301827"/>
+            <a:off x="2821244" y="301827"/>
             <a:ext cx="0" cy="916579"/>
           </a:xfrm>
           <a:prstGeom prst="line">
@@ -23824,6 +23824,42 @@
           </a:p>
         </p:txBody>
       </p:sp>
+      <p:cxnSp>
+        <p:nvCxnSpPr>
+          <p:cNvPr id="12" name="Straight Connector 11">
+            <a:extLst>
+              <a:ext uri="{FF2B5EF4-FFF2-40B4-BE49-F238E27FC236}">
+                <a16:creationId xmlns:a16="http://schemas.microsoft.com/office/drawing/2014/main" id="{34127603-0DC1-4807-B3A0-D2E588ACF808}"/>
+              </a:ext>
+            </a:extLst>
+          </p:cNvPr>
+          <p:cNvCxnSpPr/>
+          <p:nvPr/>
+        </p:nvCxnSpPr>
+        <p:spPr>
+          <a:xfrm>
+            <a:off x="9739495" y="314615"/>
+            <a:ext cx="0" cy="916579"/>
+          </a:xfrm>
+          <a:prstGeom prst="line">
+            <a:avLst/>
+          </a:prstGeom>
+        </p:spPr>
+        <p:style>
+          <a:lnRef idx="2">
+            <a:schemeClr val="accent3"/>
+          </a:lnRef>
+          <a:fillRef idx="0">
+            <a:schemeClr val="accent3"/>
+          </a:fillRef>
+          <a:effectRef idx="1">
+            <a:schemeClr val="accent3"/>
+          </a:effectRef>
+          <a:fontRef idx="minor">
+            <a:schemeClr val="tx1"/>
+          </a:fontRef>
+        </p:style>
+      </p:cxnSp>
     </p:spTree>
     <p:extLst>
       <p:ext uri="{BB962C8B-B14F-4D97-AF65-F5344CB8AC3E}">

</xml_diff>

<commit_message>
Hello 👋  WeAreDevelopers 2025
</commit_message>
<xml_diff>
--- a/multi-tenancy-wearedevelopers-2025_30mins.pptx
+++ b/multi-tenancy-wearedevelopers-2025_30mins.pptx
@@ -3453,7 +3453,7 @@
           <a:p>
             <a:fld id="{0243448F-3A69-4D00-BEC4-199950B08586}" type="datetimeFigureOut">
               <a:rPr lang="en-US" smtClean="0"/>
-              <a:t>7/10/2025</a:t>
+              <a:t>7/11/2025</a:t>
             </a:fld>
             <a:endParaRPr lang="en-US"/>
           </a:p>
@@ -10059,15 +10059,7 @@
             </a:r>
             <a:r>
               <a:rPr lang="en-US" b="0" i="0" dirty="0"/>
-              <a:t> Shouldn’t </a:t>
-            </a:r>
-            <a:r>
-              <a:rPr lang="en-US" b="1" i="0" dirty="0"/>
-              <a:t>pass</a:t>
-            </a:r>
-            <a:r>
-              <a:rPr lang="en-US" b="0" i="0" dirty="0"/>
-              <a:t> </a:t>
+              <a:t> Shouldn’t pass </a:t>
             </a:r>
             <a:r>
               <a:rPr lang="en-US" b="1" i="1" dirty="0" err="1"/>
@@ -10288,27 +10280,31 @@
             </a:r>
             <a:r>
               <a:rPr lang="en-US" dirty="0"/>
-              <a:t>Ensuring that all tenants receive updates and improvements at the same time. </a:t>
-            </a:r>
-            <a:r>
-              <a:rPr lang="en-US" b="1" noProof="0" dirty="0"/>
-              <a:t>F</a:t>
-            </a:r>
-            <a:r>
-              <a:rPr lang="en-US" b="1" dirty="0" err="1"/>
-              <a:t>ocus</a:t>
-            </a:r>
-            <a:r>
-              <a:rPr lang="en-US" b="1" dirty="0"/>
-              <a:t> on maintaining a single codebase</a:t>
-            </a:r>
-            <a:r>
-              <a:rPr lang="en-US" dirty="0"/>
-              <a:t>, </a:t>
-            </a:r>
-            <a:br>
-              <a:rPr lang="en-US" dirty="0"/>
-            </a:br>
+              <a:t>Ensuring that all tenants receive updates and improvements at the same time</a:t>
+            </a:r>
+            <a:r>
+              <a:rPr lang="en-US"/>
+              <a:t>. </a:t>
+            </a:r>
+          </a:p>
+          <a:p>
+            <a:pPr marL="228600" marR="0" lvl="0" indent="-228600" algn="l" defTabSz="914400" rtl="0" eaLnBrk="1" fontAlgn="auto" latinLnBrk="0" hangingPunct="1">
+              <a:lnSpc>
+                <a:spcPct val="100000"/>
+              </a:lnSpc>
+              <a:spcBef>
+                <a:spcPts val="0"/>
+              </a:spcBef>
+              <a:spcAft>
+                <a:spcPts val="0"/>
+              </a:spcAft>
+              <a:buClrTx/>
+              <a:buSzTx/>
+              <a:buFont typeface="+mj-lt"/>
+              <a:buAutoNum type="arabicPeriod"/>
+              <a:tabLst/>
+              <a:defRPr/>
+            </a:pPr>
             <a:endParaRPr lang="en-US" dirty="0"/>
           </a:p>
           <a:p>
@@ -11252,7 +11248,7 @@
           <a:p>
             <a:fld id="{2A14C9FE-EBC3-45D3-899C-58AAF4F8AF71}" type="datetimeFigureOut">
               <a:rPr lang="en-US" smtClean="0"/>
-              <a:t>7/10/2025</a:t>
+              <a:t>7/11/2025</a:t>
             </a:fld>
             <a:endParaRPr lang="en-US"/>
           </a:p>
@@ -11450,7 +11446,7 @@
           <a:p>
             <a:fld id="{2A14C9FE-EBC3-45D3-899C-58AAF4F8AF71}" type="datetimeFigureOut">
               <a:rPr lang="en-US" smtClean="0"/>
-              <a:t>7/10/2025</a:t>
+              <a:t>7/11/2025</a:t>
             </a:fld>
             <a:endParaRPr lang="en-US"/>
           </a:p>
@@ -11658,7 +11654,7 @@
           <a:p>
             <a:fld id="{2A14C9FE-EBC3-45D3-899C-58AAF4F8AF71}" type="datetimeFigureOut">
               <a:rPr lang="en-US" smtClean="0"/>
-              <a:t>7/10/2025</a:t>
+              <a:t>7/11/2025</a:t>
             </a:fld>
             <a:endParaRPr lang="en-US"/>
           </a:p>
@@ -11856,7 +11852,7 @@
           <a:p>
             <a:fld id="{2A14C9FE-EBC3-45D3-899C-58AAF4F8AF71}" type="datetimeFigureOut">
               <a:rPr lang="en-US" smtClean="0"/>
-              <a:t>7/10/2025</a:t>
+              <a:t>7/11/2025</a:t>
             </a:fld>
             <a:endParaRPr lang="en-US"/>
           </a:p>
@@ -12131,7 +12127,7 @@
           <a:p>
             <a:fld id="{2A14C9FE-EBC3-45D3-899C-58AAF4F8AF71}" type="datetimeFigureOut">
               <a:rPr lang="en-US" smtClean="0"/>
-              <a:t>7/10/2025</a:t>
+              <a:t>7/11/2025</a:t>
             </a:fld>
             <a:endParaRPr lang="en-US"/>
           </a:p>
@@ -12396,7 +12392,7 @@
           <a:p>
             <a:fld id="{2A14C9FE-EBC3-45D3-899C-58AAF4F8AF71}" type="datetimeFigureOut">
               <a:rPr lang="en-US" smtClean="0"/>
-              <a:t>7/10/2025</a:t>
+              <a:t>7/11/2025</a:t>
             </a:fld>
             <a:endParaRPr lang="en-US"/>
           </a:p>
@@ -12808,7 +12804,7 @@
           <a:p>
             <a:fld id="{2A14C9FE-EBC3-45D3-899C-58AAF4F8AF71}" type="datetimeFigureOut">
               <a:rPr lang="en-US" smtClean="0"/>
-              <a:t>7/10/2025</a:t>
+              <a:t>7/11/2025</a:t>
             </a:fld>
             <a:endParaRPr lang="en-US"/>
           </a:p>
@@ -12949,7 +12945,7 @@
           <a:p>
             <a:fld id="{2A14C9FE-EBC3-45D3-899C-58AAF4F8AF71}" type="datetimeFigureOut">
               <a:rPr lang="en-US" smtClean="0"/>
-              <a:t>7/10/2025</a:t>
+              <a:t>7/11/2025</a:t>
             </a:fld>
             <a:endParaRPr lang="en-US"/>
           </a:p>
@@ -13062,7 +13058,7 @@
           <a:p>
             <a:fld id="{2A14C9FE-EBC3-45D3-899C-58AAF4F8AF71}" type="datetimeFigureOut">
               <a:rPr lang="en-US" smtClean="0"/>
-              <a:t>7/10/2025</a:t>
+              <a:t>7/11/2025</a:t>
             </a:fld>
             <a:endParaRPr lang="en-US"/>
           </a:p>
@@ -13373,7 +13369,7 @@
           <a:p>
             <a:fld id="{2A14C9FE-EBC3-45D3-899C-58AAF4F8AF71}" type="datetimeFigureOut">
               <a:rPr lang="en-US" smtClean="0"/>
-              <a:t>7/10/2025</a:t>
+              <a:t>7/11/2025</a:t>
             </a:fld>
             <a:endParaRPr lang="en-US"/>
           </a:p>
@@ -13661,7 +13657,7 @@
           <a:p>
             <a:fld id="{2A14C9FE-EBC3-45D3-899C-58AAF4F8AF71}" type="datetimeFigureOut">
               <a:rPr lang="en-US" smtClean="0"/>
-              <a:t>7/10/2025</a:t>
+              <a:t>7/11/2025</a:t>
             </a:fld>
             <a:endParaRPr lang="en-US"/>
           </a:p>
@@ -13911,7 +13907,7 @@
           <a:p>
             <a:fld id="{2A14C9FE-EBC3-45D3-899C-58AAF4F8AF71}" type="datetimeFigureOut">
               <a:rPr lang="en-US" smtClean="0"/>
-              <a:t>7/10/2025</a:t>
+              <a:t>7/11/2025</a:t>
             </a:fld>
             <a:endParaRPr lang="en-US"/>
           </a:p>
@@ -21751,7 +21747,7 @@
           <a:graphicData uri="http://schemas.openxmlformats.org/presentationml/2006/ole">
             <mc:AlternateContent xmlns:mc="http://schemas.openxmlformats.org/markup-compatibility/2006">
               <mc:Choice xmlns:v="urn:schemas-microsoft-com:vml" Requires="v">
-                <p:oleObj spid="_x0000_s1042" name="Bitmap Image" r:id="rId5" imgW="6610320" imgH="1574640" progId="Paint.Picture">
+                <p:oleObj spid="_x0000_s1044" name="Bitmap Image" r:id="rId5" imgW="6610320" imgH="1574640" progId="Paint.Picture">
                   <p:embed/>
                 </p:oleObj>
               </mc:Choice>

</xml_diff>